<commit_message>
BotPlayer done, presentation progress
</commit_message>
<xml_diff>
--- a/Projektpräsentation SE.pptx
+++ b/Projektpräsentation SE.pptx
@@ -14,14 +14,13 @@
     <p:sldId id="267" r:id="rId8"/>
     <p:sldId id="261" r:id="rId9"/>
     <p:sldId id="266" r:id="rId10"/>
-    <p:sldId id="260" r:id="rId11"/>
-    <p:sldId id="259" r:id="rId12"/>
-    <p:sldId id="268" r:id="rId13"/>
-    <p:sldId id="269" r:id="rId14"/>
-    <p:sldId id="270" r:id="rId15"/>
-    <p:sldId id="271" r:id="rId16"/>
-    <p:sldId id="272" r:id="rId17"/>
-    <p:sldId id="273" r:id="rId18"/>
+    <p:sldId id="259" r:id="rId11"/>
+    <p:sldId id="268" r:id="rId12"/>
+    <p:sldId id="269" r:id="rId13"/>
+    <p:sldId id="270" r:id="rId14"/>
+    <p:sldId id="271" r:id="rId15"/>
+    <p:sldId id="272" r:id="rId16"/>
+    <p:sldId id="273" r:id="rId17"/>
   </p:sldIdLst>
   <p:sldSz cx="12192000" cy="6858000"/>
   <p:notesSz cx="6858000" cy="9144000"/>
@@ -259,7 +258,7 @@
           <a:p>
             <a:fld id="{3C5F9BCB-00A0-4E54-A614-FF14A5BEE8D6}" type="datetimeFigureOut">
               <a:rPr lang="de-DE" smtClean="0"/>
-              <a:t>16.01.2018</a:t>
+              <a:t>23.01.2018</a:t>
             </a:fld>
             <a:endParaRPr lang="de-DE"/>
           </a:p>
@@ -429,7 +428,7 @@
           <a:p>
             <a:fld id="{3C5F9BCB-00A0-4E54-A614-FF14A5BEE8D6}" type="datetimeFigureOut">
               <a:rPr lang="de-DE" smtClean="0"/>
-              <a:t>16.01.2018</a:t>
+              <a:t>23.01.2018</a:t>
             </a:fld>
             <a:endParaRPr lang="de-DE"/>
           </a:p>
@@ -609,7 +608,7 @@
           <a:p>
             <a:fld id="{3C5F9BCB-00A0-4E54-A614-FF14A5BEE8D6}" type="datetimeFigureOut">
               <a:rPr lang="de-DE" smtClean="0"/>
-              <a:t>16.01.2018</a:t>
+              <a:t>23.01.2018</a:t>
             </a:fld>
             <a:endParaRPr lang="de-DE"/>
           </a:p>
@@ -779,7 +778,7 @@
           <a:p>
             <a:fld id="{3C5F9BCB-00A0-4E54-A614-FF14A5BEE8D6}" type="datetimeFigureOut">
               <a:rPr lang="de-DE" smtClean="0"/>
-              <a:t>16.01.2018</a:t>
+              <a:t>23.01.2018</a:t>
             </a:fld>
             <a:endParaRPr lang="de-DE"/>
           </a:p>
@@ -1025,7 +1024,7 @@
           <a:p>
             <a:fld id="{3C5F9BCB-00A0-4E54-A614-FF14A5BEE8D6}" type="datetimeFigureOut">
               <a:rPr lang="de-DE" smtClean="0"/>
-              <a:t>16.01.2018</a:t>
+              <a:t>23.01.2018</a:t>
             </a:fld>
             <a:endParaRPr lang="de-DE"/>
           </a:p>
@@ -1257,7 +1256,7 @@
           <a:p>
             <a:fld id="{3C5F9BCB-00A0-4E54-A614-FF14A5BEE8D6}" type="datetimeFigureOut">
               <a:rPr lang="de-DE" smtClean="0"/>
-              <a:t>16.01.2018</a:t>
+              <a:t>23.01.2018</a:t>
             </a:fld>
             <a:endParaRPr lang="de-DE"/>
           </a:p>
@@ -1624,7 +1623,7 @@
           <a:p>
             <a:fld id="{3C5F9BCB-00A0-4E54-A614-FF14A5BEE8D6}" type="datetimeFigureOut">
               <a:rPr lang="de-DE" smtClean="0"/>
-              <a:t>16.01.2018</a:t>
+              <a:t>23.01.2018</a:t>
             </a:fld>
             <a:endParaRPr lang="de-DE"/>
           </a:p>
@@ -1742,7 +1741,7 @@
           <a:p>
             <a:fld id="{3C5F9BCB-00A0-4E54-A614-FF14A5BEE8D6}" type="datetimeFigureOut">
               <a:rPr lang="de-DE" smtClean="0"/>
-              <a:t>16.01.2018</a:t>
+              <a:t>23.01.2018</a:t>
             </a:fld>
             <a:endParaRPr lang="de-DE"/>
           </a:p>
@@ -1837,7 +1836,7 @@
           <a:p>
             <a:fld id="{3C5F9BCB-00A0-4E54-A614-FF14A5BEE8D6}" type="datetimeFigureOut">
               <a:rPr lang="de-DE" smtClean="0"/>
-              <a:t>16.01.2018</a:t>
+              <a:t>23.01.2018</a:t>
             </a:fld>
             <a:endParaRPr lang="de-DE"/>
           </a:p>
@@ -2114,7 +2113,7 @@
           <a:p>
             <a:fld id="{3C5F9BCB-00A0-4E54-A614-FF14A5BEE8D6}" type="datetimeFigureOut">
               <a:rPr lang="de-DE" smtClean="0"/>
-              <a:t>16.01.2018</a:t>
+              <a:t>23.01.2018</a:t>
             </a:fld>
             <a:endParaRPr lang="de-DE"/>
           </a:p>
@@ -2367,7 +2366,7 @@
           <a:p>
             <a:fld id="{3C5F9BCB-00A0-4E54-A614-FF14A5BEE8D6}" type="datetimeFigureOut">
               <a:rPr lang="de-DE" smtClean="0"/>
-              <a:t>16.01.2018</a:t>
+              <a:t>23.01.2018</a:t>
             </a:fld>
             <a:endParaRPr lang="de-DE"/>
           </a:p>
@@ -2432,9 +2431,18 @@
 <p:sldMaster xmlns:a="http://schemas.openxmlformats.org/drawingml/2006/main" xmlns:r="http://schemas.openxmlformats.org/officeDocument/2006/relationships" xmlns:p="http://schemas.openxmlformats.org/presentationml/2006/main">
   <p:cSld>
     <p:bg>
-      <p:bgRef idx="1001">
-        <a:schemeClr val="bg1"/>
-      </p:bgRef>
+      <p:bgPr>
+        <a:blipFill dpi="0" rotWithShape="1">
+          <a:blip r:embed="rId13">
+            <a:lum/>
+          </a:blip>
+          <a:srcRect/>
+          <a:stretch>
+            <a:fillRect/>
+          </a:stretch>
+        </a:blipFill>
+        <a:effectLst/>
+      </p:bgPr>
     </p:bg>
     <p:spTree>
       <p:nvGrpSpPr>
@@ -2580,7 +2588,7 @@
           <a:p>
             <a:fld id="{3C5F9BCB-00A0-4E54-A614-FF14A5BEE8D6}" type="datetimeFigureOut">
               <a:rPr lang="de-DE" smtClean="0"/>
-              <a:t>16.01.2018</a:t>
+              <a:t>23.01.2018</a:t>
             </a:fld>
             <a:endParaRPr lang="de-DE"/>
           </a:p>
@@ -3072,10 +3080,18 @@
           <a:lstStyle/>
           <a:p>
             <a:r>
-              <a:rPr lang="de-DE" dirty="0" smtClean="0"/>
+              <a:rPr lang="de-DE" dirty="0" smtClean="0">
+                <a:solidFill>
+                  <a:schemeClr val="bg1"/>
+                </a:solidFill>
+              </a:rPr>
               <a:t>Gruppe 5: Ralph Segi, Jan Kaiser</a:t>
             </a:r>
-            <a:endParaRPr lang="de-DE" dirty="0"/>
+            <a:endParaRPr lang="de-DE" dirty="0">
+              <a:solidFill>
+                <a:schemeClr val="bg1"/>
+              </a:solidFill>
+            </a:endParaRPr>
           </a:p>
         </p:txBody>
       </p:sp>
@@ -3102,14 +3118,6 @@
 <file path=ppt/slides/slide10.xml><?xml version="1.0" encoding="utf-8"?>
 <p:sld xmlns:a="http://schemas.openxmlformats.org/drawingml/2006/main" xmlns:r="http://schemas.openxmlformats.org/officeDocument/2006/relationships" xmlns:p="http://schemas.openxmlformats.org/presentationml/2006/main">
   <p:cSld>
-    <p:bg>
-      <p:bgPr>
-        <a:solidFill>
-          <a:schemeClr val="bg1"/>
-        </a:solidFill>
-        <a:effectLst/>
-      </p:bgPr>
-    </p:bg>
     <p:spTree>
       <p:nvGrpSpPr>
         <p:cNvPr id="1" name=""/>
@@ -3141,36 +3149,63 @@
           <a:p>
             <a:pPr algn="ctr"/>
             <a:r>
+              <a:rPr lang="de-DE" dirty="0" smtClean="0">
+                <a:solidFill>
+                  <a:schemeClr val="bg1"/>
+                </a:solidFill>
+              </a:rPr>
+              <a:t>Design Patterns</a:t>
+            </a:r>
+            <a:endParaRPr lang="de-DE" dirty="0">
+              <a:solidFill>
+                <a:schemeClr val="bg1"/>
+              </a:solidFill>
+            </a:endParaRPr>
+          </a:p>
+        </p:txBody>
+      </p:sp>
+      <p:sp>
+        <p:nvSpPr>
+          <p:cNvPr id="3" name="Inhaltsplatzhalter 2"/>
+          <p:cNvSpPr>
+            <a:spLocks noGrp="1"/>
+          </p:cNvSpPr>
+          <p:nvPr>
+            <p:ph idx="1"/>
+          </p:nvPr>
+        </p:nvSpPr>
+        <p:spPr/>
+        <p:txBody>
+          <a:bodyPr/>
+          <a:lstStyle/>
+          <a:p>
+            <a:r>
               <a:rPr lang="de-DE" dirty="0" smtClean="0"/>
-              <a:t>CI, Build tools (with Jenkins / Sonar)</a:t>
-            </a:r>
-            <a:endParaRPr lang="de-DE" dirty="0"/>
-          </a:p>
-        </p:txBody>
-      </p:sp>
-      <p:sp>
-        <p:nvSpPr>
-          <p:cNvPr id="3" name="Inhaltsplatzhalter 2"/>
-          <p:cNvSpPr>
-            <a:spLocks noGrp="1"/>
-          </p:cNvSpPr>
-          <p:nvPr>
-            <p:ph idx="1"/>
-          </p:nvPr>
-        </p:nvSpPr>
-        <p:spPr/>
-        <p:txBody>
-          <a:bodyPr/>
-          <a:lstStyle/>
-          <a:p>
-            <a:endParaRPr lang="de-DE" dirty="0"/>
+              <a:t>Observer</a:t>
+            </a:r>
+          </a:p>
+          <a:p>
+            <a:r>
+              <a:rPr lang="de-DE" dirty="0" smtClean="0"/>
+              <a:t>Singleton</a:t>
+            </a:r>
+          </a:p>
+          <a:p>
+            <a:r>
+              <a:rPr lang="de-DE" dirty="0" err="1" smtClean="0"/>
+              <a:t>Strategy</a:t>
+            </a:r>
+            <a:r>
+              <a:rPr lang="de-DE" dirty="0" smtClean="0"/>
+              <a:t>/State Pattern</a:t>
+            </a:r>
           </a:p>
         </p:txBody>
       </p:sp>
     </p:spTree>
     <p:extLst>
       <p:ext uri="{BB962C8B-B14F-4D97-AF65-F5344CB8AC3E}">
-        <p14:creationId xmlns:p14="http://schemas.microsoft.com/office/powerpoint/2010/main" val="51417347"/>
+        <p14:creationId xmlns:p14="http://schemas.microsoft.com/office/powerpoint/2010/main" val="1613925234"/>
       </p:ext>
     </p:extLst>
   </p:cSld>
@@ -3183,14 +3218,6 @@
 <file path=ppt/slides/slide11.xml><?xml version="1.0" encoding="utf-8"?>
 <p:sld xmlns:a="http://schemas.openxmlformats.org/drawingml/2006/main" xmlns:r="http://schemas.openxmlformats.org/officeDocument/2006/relationships" xmlns:p="http://schemas.openxmlformats.org/presentationml/2006/main">
   <p:cSld>
-    <p:bg>
-      <p:bgPr>
-        <a:solidFill>
-          <a:schemeClr val="bg1"/>
-        </a:solidFill>
-        <a:effectLst/>
-      </p:bgPr>
-    </p:bg>
     <p:spTree>
       <p:nvGrpSpPr>
         <p:cNvPr id="1" name=""/>
@@ -3222,55 +3249,72 @@
           <a:p>
             <a:pPr algn="ctr"/>
             <a:r>
+              <a:rPr lang="de-DE" dirty="0" smtClean="0">
+                <a:solidFill>
+                  <a:schemeClr val="bg1"/>
+                </a:solidFill>
+              </a:rPr>
+              <a:t>Observer Pattern</a:t>
+            </a:r>
+            <a:endParaRPr lang="de-DE" dirty="0">
+              <a:solidFill>
+                <a:schemeClr val="bg1"/>
+              </a:solidFill>
+            </a:endParaRPr>
+          </a:p>
+        </p:txBody>
+      </p:sp>
+      <p:sp>
+        <p:nvSpPr>
+          <p:cNvPr id="3" name="Inhaltsplatzhalter 2"/>
+          <p:cNvSpPr>
+            <a:spLocks noGrp="1"/>
+          </p:cNvSpPr>
+          <p:nvPr>
+            <p:ph idx="1"/>
+          </p:nvPr>
+        </p:nvSpPr>
+        <p:spPr/>
+        <p:txBody>
+          <a:bodyPr/>
+          <a:lstStyle/>
+          <a:p>
+            <a:r>
               <a:rPr lang="de-DE" dirty="0" smtClean="0"/>
-              <a:t>Design Patterns</a:t>
+              <a:t>&lt;Code </a:t>
+            </a:r>
+            <a:r>
+              <a:rPr lang="de-DE" dirty="0" err="1" smtClean="0"/>
+              <a:t>Example</a:t>
+            </a:r>
+            <a:r>
+              <a:rPr lang="de-DE" dirty="0" smtClean="0"/>
+              <a:t> / Code </a:t>
+            </a:r>
+            <a:r>
+              <a:rPr lang="de-DE" dirty="0" err="1" smtClean="0"/>
+              <a:t>Structure</a:t>
+            </a:r>
+            <a:r>
+              <a:rPr lang="de-DE" dirty="0" smtClean="0"/>
+              <a:t> </a:t>
+            </a:r>
+            <a:r>
+              <a:rPr lang="de-DE" dirty="0" err="1" smtClean="0"/>
+              <a:t>picture</a:t>
+            </a:r>
+            <a:r>
+              <a:rPr lang="de-DE" dirty="0" smtClean="0"/>
+              <a:t>&gt; / UML Diagramm</a:t>
             </a:r>
             <a:endParaRPr lang="de-DE" dirty="0"/>
-          </a:p>
-        </p:txBody>
-      </p:sp>
-      <p:sp>
-        <p:nvSpPr>
-          <p:cNvPr id="3" name="Inhaltsplatzhalter 2"/>
-          <p:cNvSpPr>
-            <a:spLocks noGrp="1"/>
-          </p:cNvSpPr>
-          <p:nvPr>
-            <p:ph idx="1"/>
-          </p:nvPr>
-        </p:nvSpPr>
-        <p:spPr/>
-        <p:txBody>
-          <a:bodyPr/>
-          <a:lstStyle/>
-          <a:p>
-            <a:r>
-              <a:rPr lang="de-DE" dirty="0" smtClean="0"/>
-              <a:t>Observer</a:t>
-            </a:r>
-          </a:p>
-          <a:p>
-            <a:r>
-              <a:rPr lang="de-DE" dirty="0" smtClean="0"/>
-              <a:t>Singleton</a:t>
-            </a:r>
-          </a:p>
-          <a:p>
-            <a:r>
-              <a:rPr lang="de-DE" dirty="0" err="1" smtClean="0"/>
-              <a:t>Strategy</a:t>
-            </a:r>
-            <a:r>
-              <a:rPr lang="de-DE" dirty="0" smtClean="0"/>
-              <a:t>/State Pattern</a:t>
-            </a:r>
           </a:p>
         </p:txBody>
       </p:sp>
     </p:spTree>
     <p:extLst>
       <p:ext uri="{BB962C8B-B14F-4D97-AF65-F5344CB8AC3E}">
-        <p14:creationId xmlns:p14="http://schemas.microsoft.com/office/powerpoint/2010/main" val="1613925234"/>
+        <p14:creationId xmlns:p14="http://schemas.microsoft.com/office/powerpoint/2010/main" val="4019749663"/>
       </p:ext>
     </p:extLst>
   </p:cSld>
@@ -3314,10 +3358,18 @@
           <a:p>
             <a:pPr algn="ctr"/>
             <a:r>
-              <a:rPr lang="de-DE" dirty="0" smtClean="0"/>
-              <a:t>Observer Pattern</a:t>
-            </a:r>
-            <a:endParaRPr lang="de-DE" dirty="0"/>
+              <a:rPr lang="de-DE" dirty="0" smtClean="0">
+                <a:solidFill>
+                  <a:schemeClr val="bg1"/>
+                </a:solidFill>
+              </a:rPr>
+              <a:t>Singleton</a:t>
+            </a:r>
+            <a:endParaRPr lang="de-DE" dirty="0">
+              <a:solidFill>
+                <a:schemeClr val="bg1"/>
+              </a:solidFill>
+            </a:endParaRPr>
           </a:p>
         </p:txBody>
       </p:sp>
@@ -3346,23 +3398,7 @@
             </a:r>
             <a:r>
               <a:rPr lang="de-DE" dirty="0" smtClean="0"/>
-              <a:t> / Code </a:t>
-            </a:r>
-            <a:r>
-              <a:rPr lang="de-DE" dirty="0" err="1" smtClean="0"/>
-              <a:t>Structure</a:t>
-            </a:r>
-            <a:r>
-              <a:rPr lang="de-DE" dirty="0" smtClean="0"/>
-              <a:t> </a:t>
-            </a:r>
-            <a:r>
-              <a:rPr lang="de-DE" dirty="0" err="1" smtClean="0"/>
-              <a:t>picture</a:t>
-            </a:r>
-            <a:r>
-              <a:rPr lang="de-DE" dirty="0" smtClean="0"/>
-              <a:t>&gt; / UML Diagramm</a:t>
+              <a:t>&gt;</a:t>
             </a:r>
             <a:endParaRPr lang="de-DE" dirty="0"/>
           </a:p>
@@ -3371,7 +3407,7 @@
     </p:spTree>
     <p:extLst>
       <p:ext uri="{BB962C8B-B14F-4D97-AF65-F5344CB8AC3E}">
-        <p14:creationId xmlns:p14="http://schemas.microsoft.com/office/powerpoint/2010/main" val="4019749663"/>
+        <p14:creationId xmlns:p14="http://schemas.microsoft.com/office/powerpoint/2010/main" val="910030437"/>
       </p:ext>
     </p:extLst>
   </p:cSld>
@@ -3415,39 +3451,71 @@
           <a:p>
             <a:pPr algn="ctr"/>
             <a:r>
+              <a:rPr lang="de-DE" dirty="0" smtClean="0">
+                <a:solidFill>
+                  <a:schemeClr val="bg1"/>
+                </a:solidFill>
+              </a:rPr>
+              <a:t>Strategy / State Pattern</a:t>
+            </a:r>
+            <a:endParaRPr lang="de-DE" dirty="0">
+              <a:solidFill>
+                <a:schemeClr val="bg1"/>
+              </a:solidFill>
+            </a:endParaRPr>
+          </a:p>
+        </p:txBody>
+      </p:sp>
+      <p:sp>
+        <p:nvSpPr>
+          <p:cNvPr id="3" name="Inhaltsplatzhalter 2"/>
+          <p:cNvSpPr>
+            <a:spLocks noGrp="1"/>
+          </p:cNvSpPr>
+          <p:nvPr>
+            <p:ph idx="1"/>
+          </p:nvPr>
+        </p:nvSpPr>
+        <p:spPr/>
+        <p:txBody>
+          <a:bodyPr/>
+          <a:lstStyle/>
+          <a:p>
+            <a:r>
               <a:rPr lang="de-DE" dirty="0" smtClean="0"/>
-              <a:t>Singleton</a:t>
-            </a:r>
-            <a:endParaRPr lang="de-DE" dirty="0"/>
-          </a:p>
-        </p:txBody>
-      </p:sp>
-      <p:sp>
-        <p:nvSpPr>
-          <p:cNvPr id="3" name="Inhaltsplatzhalter 2"/>
-          <p:cNvSpPr>
-            <a:spLocks noGrp="1"/>
-          </p:cNvSpPr>
-          <p:nvPr>
-            <p:ph idx="1"/>
-          </p:nvPr>
-        </p:nvSpPr>
-        <p:spPr/>
-        <p:txBody>
-          <a:bodyPr/>
-          <a:lstStyle/>
-          <a:p>
+              <a:t>Eins von beiden aufzeigen, </a:t>
+            </a:r>
+            <a:r>
+              <a:rPr lang="de-DE" dirty="0" err="1" smtClean="0"/>
+              <a:t>evtl</a:t>
+            </a:r>
             <a:r>
               <a:rPr lang="de-DE" dirty="0" smtClean="0"/>
-              <a:t>&lt;Code </a:t>
+              <a:t> Strategy (</a:t>
             </a:r>
             <a:r>
               <a:rPr lang="de-DE" dirty="0" err="1" smtClean="0"/>
-              <a:t>Example</a:t>
+              <a:t>LanguageHandler</a:t>
             </a:r>
             <a:r>
               <a:rPr lang="de-DE" dirty="0" smtClean="0"/>
-              <a:t>&gt;</a:t>
+              <a:t>) für </a:t>
+            </a:r>
+            <a:r>
+              <a:rPr lang="de-DE" dirty="0" err="1" smtClean="0"/>
+              <a:t>Dependendy</a:t>
+            </a:r>
+            <a:r>
+              <a:rPr lang="de-DE" dirty="0" smtClean="0"/>
+              <a:t> </a:t>
+            </a:r>
+            <a:r>
+              <a:rPr lang="de-DE" dirty="0" err="1" smtClean="0"/>
+              <a:t>Injection</a:t>
+            </a:r>
+            <a:r>
+              <a:rPr lang="de-DE" dirty="0" smtClean="0"/>
+              <a:t> verwenden</a:t>
             </a:r>
             <a:endParaRPr lang="de-DE" dirty="0"/>
           </a:p>
@@ -3456,7 +3524,7 @@
     </p:spTree>
     <p:extLst>
       <p:ext uri="{BB962C8B-B14F-4D97-AF65-F5344CB8AC3E}">
-        <p14:creationId xmlns:p14="http://schemas.microsoft.com/office/powerpoint/2010/main" val="910030437"/>
+        <p14:creationId xmlns:p14="http://schemas.microsoft.com/office/powerpoint/2010/main" val="1008572906"/>
       </p:ext>
     </p:extLst>
   </p:cSld>
@@ -3500,63 +3568,53 @@
           <a:p>
             <a:pPr algn="ctr"/>
             <a:r>
+              <a:rPr lang="de-DE" dirty="0" smtClean="0">
+                <a:solidFill>
+                  <a:schemeClr val="bg1"/>
+                </a:solidFill>
+              </a:rPr>
+              <a:t>GUI Development</a:t>
+            </a:r>
+            <a:endParaRPr lang="de-DE" dirty="0">
+              <a:solidFill>
+                <a:schemeClr val="bg1"/>
+              </a:solidFill>
+            </a:endParaRPr>
+          </a:p>
+        </p:txBody>
+      </p:sp>
+      <p:sp>
+        <p:nvSpPr>
+          <p:cNvPr id="3" name="Inhaltsplatzhalter 2"/>
+          <p:cNvSpPr>
+            <a:spLocks noGrp="1"/>
+          </p:cNvSpPr>
+          <p:nvPr>
+            <p:ph idx="1"/>
+          </p:nvPr>
+        </p:nvSpPr>
+        <p:spPr/>
+        <p:txBody>
+          <a:bodyPr/>
+          <a:lstStyle/>
+          <a:p>
+            <a:r>
               <a:rPr lang="de-DE" dirty="0" smtClean="0"/>
-              <a:t>Strategy / State Pattern</a:t>
-            </a:r>
-            <a:endParaRPr lang="de-DE" dirty="0"/>
-          </a:p>
-        </p:txBody>
-      </p:sp>
-      <p:sp>
-        <p:nvSpPr>
-          <p:cNvPr id="3" name="Inhaltsplatzhalter 2"/>
-          <p:cNvSpPr>
-            <a:spLocks noGrp="1"/>
-          </p:cNvSpPr>
-          <p:nvPr>
-            <p:ph idx="1"/>
-          </p:nvPr>
-        </p:nvSpPr>
-        <p:spPr/>
-        <p:txBody>
-          <a:bodyPr/>
-          <a:lstStyle/>
-          <a:p>
+              <a:t>&lt;Code </a:t>
+            </a:r>
+            <a:r>
+              <a:rPr lang="de-DE" dirty="0" err="1" smtClean="0"/>
+              <a:t>Example</a:t>
+            </a:r>
             <a:r>
               <a:rPr lang="de-DE" dirty="0" smtClean="0"/>
-              <a:t>Eins von beiden aufzeigen, </a:t>
-            </a:r>
-            <a:r>
-              <a:rPr lang="de-DE" dirty="0" err="1" smtClean="0"/>
-              <a:t>evtl</a:t>
-            </a:r>
+              <a:t>&gt;</a:t>
+            </a:r>
+          </a:p>
+          <a:p>
             <a:r>
               <a:rPr lang="de-DE" dirty="0" smtClean="0"/>
-              <a:t> Strategy (</a:t>
-            </a:r>
-            <a:r>
-              <a:rPr lang="de-DE" dirty="0" err="1" smtClean="0"/>
-              <a:t>LanguageHandler</a:t>
-            </a:r>
-            <a:r>
-              <a:rPr lang="de-DE" dirty="0" smtClean="0"/>
-              <a:t>) für </a:t>
-            </a:r>
-            <a:r>
-              <a:rPr lang="de-DE" dirty="0" err="1" smtClean="0"/>
-              <a:t>Dependendy</a:t>
-            </a:r>
-            <a:r>
-              <a:rPr lang="de-DE" dirty="0" smtClean="0"/>
-              <a:t> </a:t>
-            </a:r>
-            <a:r>
-              <a:rPr lang="de-DE" dirty="0" err="1" smtClean="0"/>
-              <a:t>Injection</a:t>
-            </a:r>
-            <a:r>
-              <a:rPr lang="de-DE" dirty="0" smtClean="0"/>
-              <a:t> verwenden</a:t>
+              <a:t>Scala Future</a:t>
             </a:r>
             <a:endParaRPr lang="de-DE" dirty="0"/>
           </a:p>
@@ -3565,7 +3623,7 @@
     </p:spTree>
     <p:extLst>
       <p:ext uri="{BB962C8B-B14F-4D97-AF65-F5344CB8AC3E}">
-        <p14:creationId xmlns:p14="http://schemas.microsoft.com/office/powerpoint/2010/main" val="1008572906"/>
+        <p14:creationId xmlns:p14="http://schemas.microsoft.com/office/powerpoint/2010/main" val="2130972528"/>
       </p:ext>
     </p:extLst>
   </p:cSld>
@@ -3609,45 +3667,55 @@
           <a:p>
             <a:pPr algn="ctr"/>
             <a:r>
+              <a:rPr lang="de-DE" dirty="0" smtClean="0">
+                <a:solidFill>
+                  <a:schemeClr val="bg1"/>
+                </a:solidFill>
+              </a:rPr>
+              <a:t>Components &amp; Interfaces</a:t>
+            </a:r>
+            <a:endParaRPr lang="de-DE" dirty="0">
+              <a:solidFill>
+                <a:schemeClr val="bg1"/>
+              </a:solidFill>
+            </a:endParaRPr>
+          </a:p>
+        </p:txBody>
+      </p:sp>
+      <p:sp>
+        <p:nvSpPr>
+          <p:cNvPr id="3" name="Inhaltsplatzhalter 2"/>
+          <p:cNvSpPr>
+            <a:spLocks noGrp="1"/>
+          </p:cNvSpPr>
+          <p:nvPr>
+            <p:ph idx="1"/>
+          </p:nvPr>
+        </p:nvSpPr>
+        <p:spPr/>
+        <p:txBody>
+          <a:bodyPr/>
+          <a:lstStyle/>
+          <a:p>
+            <a:r>
               <a:rPr lang="de-DE" dirty="0" smtClean="0"/>
-              <a:t>GUI Development</a:t>
-            </a:r>
-            <a:endParaRPr lang="de-DE" dirty="0"/>
-          </a:p>
-        </p:txBody>
-      </p:sp>
-      <p:sp>
-        <p:nvSpPr>
-          <p:cNvPr id="3" name="Inhaltsplatzhalter 2"/>
-          <p:cNvSpPr>
-            <a:spLocks noGrp="1"/>
-          </p:cNvSpPr>
-          <p:nvPr>
-            <p:ph idx="1"/>
-          </p:nvPr>
-        </p:nvSpPr>
-        <p:spPr/>
-        <p:txBody>
-          <a:bodyPr/>
-          <a:lstStyle/>
-          <a:p>
+              <a:t>&lt;Code / </a:t>
+            </a:r>
+            <a:r>
+              <a:rPr lang="de-DE" dirty="0" err="1" smtClean="0"/>
+              <a:t>Structure</a:t>
+            </a:r>
             <a:r>
               <a:rPr lang="de-DE" dirty="0" smtClean="0"/>
-              <a:t>&lt;Code </a:t>
+              <a:t> </a:t>
             </a:r>
             <a:r>
               <a:rPr lang="de-DE" dirty="0" err="1" smtClean="0"/>
-              <a:t>Example</a:t>
+              <a:t>picture</a:t>
             </a:r>
             <a:r>
               <a:rPr lang="de-DE" dirty="0" smtClean="0"/>
               <a:t>&gt;</a:t>
-            </a:r>
-          </a:p>
-          <a:p>
-            <a:r>
-              <a:rPr lang="de-DE" dirty="0" smtClean="0"/>
-              <a:t>Scala Future</a:t>
             </a:r>
             <a:endParaRPr lang="de-DE" dirty="0"/>
           </a:p>
@@ -3656,7 +3724,7 @@
     </p:spTree>
     <p:extLst>
       <p:ext uri="{BB962C8B-B14F-4D97-AF65-F5344CB8AC3E}">
-        <p14:creationId xmlns:p14="http://schemas.microsoft.com/office/powerpoint/2010/main" val="2130972528"/>
+        <p14:creationId xmlns:p14="http://schemas.microsoft.com/office/powerpoint/2010/main" val="3390244853"/>
       </p:ext>
     </p:extLst>
   </p:cSld>
@@ -3700,43 +3768,59 @@
           <a:p>
             <a:pPr algn="ctr"/>
             <a:r>
+              <a:rPr lang="de-DE" dirty="0" err="1" smtClean="0">
+                <a:solidFill>
+                  <a:schemeClr val="bg1"/>
+                </a:solidFill>
+              </a:rPr>
+              <a:t>Dependency</a:t>
+            </a:r>
+            <a:r>
+              <a:rPr lang="de-DE" dirty="0" smtClean="0">
+                <a:solidFill>
+                  <a:schemeClr val="bg1"/>
+                </a:solidFill>
+              </a:rPr>
+              <a:t> </a:t>
+            </a:r>
+            <a:r>
+              <a:rPr lang="de-DE" dirty="0" err="1" smtClean="0">
+                <a:solidFill>
+                  <a:schemeClr val="bg1"/>
+                </a:solidFill>
+              </a:rPr>
+              <a:t>Injection</a:t>
+            </a:r>
+            <a:endParaRPr lang="de-DE" dirty="0">
+              <a:solidFill>
+                <a:schemeClr val="bg1"/>
+              </a:solidFill>
+            </a:endParaRPr>
+          </a:p>
+        </p:txBody>
+      </p:sp>
+      <p:sp>
+        <p:nvSpPr>
+          <p:cNvPr id="3" name="Inhaltsplatzhalter 2"/>
+          <p:cNvSpPr>
+            <a:spLocks noGrp="1"/>
+          </p:cNvSpPr>
+          <p:nvPr>
+            <p:ph idx="1"/>
+          </p:nvPr>
+        </p:nvSpPr>
+        <p:spPr/>
+        <p:txBody>
+          <a:bodyPr/>
+          <a:lstStyle/>
+          <a:p>
+            <a:r>
               <a:rPr lang="de-DE" dirty="0" smtClean="0"/>
-              <a:t>Components &amp; Interfaces</a:t>
-            </a:r>
-            <a:endParaRPr lang="de-DE" dirty="0"/>
-          </a:p>
-        </p:txBody>
-      </p:sp>
-      <p:sp>
-        <p:nvSpPr>
-          <p:cNvPr id="3" name="Inhaltsplatzhalter 2"/>
-          <p:cNvSpPr>
-            <a:spLocks noGrp="1"/>
-          </p:cNvSpPr>
-          <p:nvPr>
-            <p:ph idx="1"/>
-          </p:nvPr>
-        </p:nvSpPr>
-        <p:spPr/>
-        <p:txBody>
-          <a:bodyPr/>
-          <a:lstStyle/>
-          <a:p>
-            <a:r>
-              <a:rPr lang="de-DE" dirty="0" smtClean="0"/>
-              <a:t>&lt;Code / </a:t>
+              <a:t>&lt;Code </a:t>
             </a:r>
             <a:r>
               <a:rPr lang="de-DE" dirty="0" err="1" smtClean="0"/>
-              <a:t>Structure</a:t>
-            </a:r>
-            <a:r>
-              <a:rPr lang="de-DE" dirty="0" smtClean="0"/>
-              <a:t> </a:t>
-            </a:r>
-            <a:r>
-              <a:rPr lang="de-DE" dirty="0" err="1" smtClean="0"/>
-              <a:t>picture</a:t>
+              <a:t>Example</a:t>
             </a:r>
             <a:r>
               <a:rPr lang="de-DE" dirty="0" smtClean="0"/>
@@ -3749,7 +3833,7 @@
     </p:spTree>
     <p:extLst>
       <p:ext uri="{BB962C8B-B14F-4D97-AF65-F5344CB8AC3E}">
-        <p14:creationId xmlns:p14="http://schemas.microsoft.com/office/powerpoint/2010/main" val="3390244853"/>
+        <p14:creationId xmlns:p14="http://schemas.microsoft.com/office/powerpoint/2010/main" val="2347765009"/>
       </p:ext>
     </p:extLst>
   </p:cSld>
@@ -3759,7 +3843,7 @@
 </p:sld>
 </file>
 
-<file path=ppt/slides/slide17.xml><?xml version="1.0" encoding="utf-8"?>
+<file path=ppt/slides/slide2.xml><?xml version="1.0" encoding="utf-8"?>
 <p:sld xmlns:a="http://schemas.openxmlformats.org/drawingml/2006/main" xmlns:r="http://schemas.openxmlformats.org/officeDocument/2006/relationships" xmlns:p="http://schemas.openxmlformats.org/presentationml/2006/main">
   <p:cSld>
     <p:spTree>
@@ -3786,113 +3870,12 @@
             <p:ph type="title"/>
           </p:nvPr>
         </p:nvSpPr>
-        <p:spPr/>
-        <p:txBody>
-          <a:bodyPr/>
-          <a:lstStyle/>
-          <a:p>
-            <a:r>
-              <a:rPr lang="de-DE" dirty="0" err="1" smtClean="0"/>
-              <a:t>Dependency</a:t>
-            </a:r>
-            <a:r>
-              <a:rPr lang="de-DE" dirty="0" smtClean="0"/>
-              <a:t> </a:t>
-            </a:r>
-            <a:r>
-              <a:rPr lang="de-DE" dirty="0" err="1" smtClean="0"/>
-              <a:t>Injection</a:t>
-            </a:r>
-            <a:endParaRPr lang="de-DE" dirty="0"/>
-          </a:p>
-        </p:txBody>
-      </p:sp>
-      <p:sp>
-        <p:nvSpPr>
-          <p:cNvPr id="3" name="Inhaltsplatzhalter 2"/>
-          <p:cNvSpPr>
-            <a:spLocks noGrp="1"/>
-          </p:cNvSpPr>
-          <p:nvPr>
-            <p:ph idx="1"/>
-          </p:nvPr>
-        </p:nvSpPr>
-        <p:spPr/>
-        <p:txBody>
-          <a:bodyPr/>
-          <a:lstStyle/>
-          <a:p>
-            <a:r>
-              <a:rPr lang="de-DE" dirty="0" smtClean="0"/>
-              <a:t>&lt;Code </a:t>
-            </a:r>
-            <a:r>
-              <a:rPr lang="de-DE" dirty="0" err="1" smtClean="0"/>
-              <a:t>Example</a:t>
-            </a:r>
-            <a:r>
-              <a:rPr lang="de-DE" dirty="0" smtClean="0"/>
-              <a:t>&gt;</a:t>
-            </a:r>
-            <a:endParaRPr lang="de-DE" dirty="0"/>
-          </a:p>
-        </p:txBody>
-      </p:sp>
-    </p:spTree>
-    <p:extLst>
-      <p:ext uri="{BB962C8B-B14F-4D97-AF65-F5344CB8AC3E}">
-        <p14:creationId xmlns:p14="http://schemas.microsoft.com/office/powerpoint/2010/main" val="2347765009"/>
-      </p:ext>
-    </p:extLst>
-  </p:cSld>
-  <p:clrMapOvr>
-    <a:masterClrMapping/>
-  </p:clrMapOvr>
-</p:sld>
-</file>
-
-<file path=ppt/slides/slide2.xml><?xml version="1.0" encoding="utf-8"?>
-<p:sld xmlns:a="http://schemas.openxmlformats.org/drawingml/2006/main" xmlns:r="http://schemas.openxmlformats.org/officeDocument/2006/relationships" xmlns:p="http://schemas.openxmlformats.org/presentationml/2006/main">
-  <p:cSld>
-    <p:bg>
-      <p:bgPr>
-        <a:blipFill dpi="0" rotWithShape="1">
-          <a:blip r:embed="rId2">
-            <a:lum/>
-          </a:blip>
-          <a:srcRect/>
-          <a:stretch>
-            <a:fillRect/>
-          </a:stretch>
-        </a:blipFill>
-        <a:effectLst/>
-      </p:bgPr>
-    </p:bg>
-    <p:spTree>
-      <p:nvGrpSpPr>
-        <p:cNvPr id="1" name=""/>
-        <p:cNvGrpSpPr/>
-        <p:nvPr/>
-      </p:nvGrpSpPr>
-      <p:grpSpPr>
-        <a:xfrm>
-          <a:off x="0" y="0"/>
-          <a:ext cx="0" cy="0"/>
-          <a:chOff x="0" y="0"/>
-          <a:chExt cx="0" cy="0"/>
-        </a:xfrm>
-      </p:grpSpPr>
-      <p:sp>
-        <p:nvSpPr>
-          <p:cNvPr id="2" name="Titel 1"/>
-          <p:cNvSpPr>
-            <a:spLocks noGrp="1"/>
-          </p:cNvSpPr>
-          <p:nvPr>
-            <p:ph type="title"/>
-          </p:nvPr>
-        </p:nvSpPr>
-        <p:spPr/>
+        <p:spPr>
+          <a:xfrm>
+            <a:off x="626445" y="307374"/>
+            <a:ext cx="10515600" cy="1325563"/>
+          </a:xfrm>
+        </p:spPr>
         <p:txBody>
           <a:bodyPr/>
           <a:lstStyle/>
@@ -3932,87 +3915,137 @@
           <a:lstStyle/>
           <a:p>
             <a:r>
-              <a:rPr lang="de-DE" sz="1800" dirty="0" smtClean="0"/>
+              <a:rPr lang="de-DE" sz="1800" dirty="0" smtClean="0">
+                <a:solidFill>
+                  <a:schemeClr val="bg1"/>
+                </a:solidFill>
+              </a:rPr>
               <a:t>Organisation: (Thema 2 u. 3)</a:t>
             </a:r>
           </a:p>
           <a:p>
             <a:pPr lvl="1"/>
             <a:r>
-              <a:rPr lang="de-DE" sz="1800" dirty="0" smtClean="0"/>
+              <a:rPr lang="de-DE" sz="1800" dirty="0" smtClean="0">
+                <a:solidFill>
+                  <a:schemeClr val="bg1"/>
+                </a:solidFill>
+              </a:rPr>
               <a:t>Scrum</a:t>
             </a:r>
           </a:p>
           <a:p>
             <a:pPr lvl="1"/>
             <a:r>
-              <a:rPr lang="de-DE" sz="1800" dirty="0" smtClean="0"/>
+              <a:rPr lang="de-DE" sz="1800" dirty="0" smtClean="0">
+                <a:solidFill>
+                  <a:schemeClr val="bg1"/>
+                </a:solidFill>
+              </a:rPr>
               <a:t>Git</a:t>
             </a:r>
           </a:p>
           <a:p>
             <a:r>
-              <a:rPr lang="de-DE" sz="1800" dirty="0" smtClean="0"/>
+              <a:rPr lang="de-DE" sz="1800" dirty="0" smtClean="0">
+                <a:solidFill>
+                  <a:schemeClr val="bg1"/>
+                </a:solidFill>
+              </a:rPr>
               <a:t>TUI Development (Thema 4)</a:t>
             </a:r>
           </a:p>
           <a:p>
             <a:r>
-              <a:rPr lang="de-DE" sz="1800" dirty="0" smtClean="0"/>
+              <a:rPr lang="de-DE" sz="1800" dirty="0" smtClean="0">
+                <a:solidFill>
+                  <a:schemeClr val="bg1"/>
+                </a:solidFill>
+              </a:rPr>
               <a:t>MVC</a:t>
             </a:r>
           </a:p>
           <a:p>
             <a:r>
-              <a:rPr lang="de-DE" sz="1800" dirty="0" smtClean="0"/>
-              <a:t>Model/Controller </a:t>
-            </a:r>
-            <a:r>
-              <a:rPr lang="de-DE" sz="1800" dirty="0" smtClean="0"/>
-              <a:t>Code </a:t>
-            </a:r>
-            <a:r>
-              <a:rPr lang="de-DE" sz="1800" dirty="0" err="1" smtClean="0"/>
+              <a:rPr lang="de-DE" sz="1800" dirty="0" smtClean="0">
+                <a:solidFill>
+                  <a:schemeClr val="bg1"/>
+                </a:solidFill>
+              </a:rPr>
+              <a:t>Model/Controller Code </a:t>
+            </a:r>
+            <a:r>
+              <a:rPr lang="de-DE" sz="1800" dirty="0" err="1" smtClean="0">
+                <a:solidFill>
+                  <a:schemeClr val="bg1"/>
+                </a:solidFill>
+              </a:rPr>
               <a:t>Coverage</a:t>
             </a:r>
-            <a:endParaRPr lang="de-DE" sz="1800" dirty="0" smtClean="0"/>
-          </a:p>
-          <a:p>
-            <a:r>
-              <a:rPr lang="de-DE" sz="1800" dirty="0" err="1" smtClean="0"/>
-              <a:t>Metrics</a:t>
-            </a:r>
-            <a:r>
-              <a:rPr lang="de-DE" sz="1800" dirty="0" smtClean="0"/>
-              <a:t> (Sonar)</a:t>
-            </a:r>
-          </a:p>
-          <a:p>
-            <a:r>
-              <a:rPr lang="de-DE" sz="1800" dirty="0" smtClean="0"/>
-              <a:t>Design Patterns</a:t>
-            </a:r>
-          </a:p>
-          <a:p>
-            <a:r>
-              <a:rPr lang="de-DE" sz="1800" dirty="0" smtClean="0"/>
+            <a:endParaRPr lang="de-DE" sz="1800" dirty="0" smtClean="0">
+              <a:solidFill>
+                <a:schemeClr val="bg1"/>
+              </a:solidFill>
+            </a:endParaRPr>
+          </a:p>
+          <a:p>
+            <a:r>
+              <a:rPr lang="de-DE" sz="1800" dirty="0" smtClean="0">
+                <a:solidFill>
+                  <a:schemeClr val="bg1"/>
+                </a:solidFill>
+              </a:rPr>
+              <a:t>Design </a:t>
+            </a:r>
+            <a:r>
+              <a:rPr lang="de-DE" sz="1800" dirty="0" smtClean="0">
+                <a:solidFill>
+                  <a:schemeClr val="bg1"/>
+                </a:solidFill>
+              </a:rPr>
+              <a:t>Patterns</a:t>
+            </a:r>
+          </a:p>
+          <a:p>
+            <a:r>
+              <a:rPr lang="de-DE" sz="1800" dirty="0" smtClean="0">
+                <a:solidFill>
+                  <a:schemeClr val="bg1"/>
+                </a:solidFill>
+              </a:rPr>
               <a:t>Components &amp; Interfaces</a:t>
             </a:r>
           </a:p>
           <a:p>
             <a:r>
-              <a:rPr lang="de-DE" sz="1800" dirty="0" err="1" smtClean="0"/>
+              <a:rPr lang="de-DE" sz="1800" dirty="0" err="1" smtClean="0">
+                <a:solidFill>
+                  <a:schemeClr val="bg1"/>
+                </a:solidFill>
+              </a:rPr>
               <a:t>Dependency</a:t>
             </a:r>
             <a:r>
-              <a:rPr lang="de-DE" sz="1800" dirty="0" smtClean="0"/>
+              <a:rPr lang="de-DE" sz="1800" dirty="0" smtClean="0">
+                <a:solidFill>
+                  <a:schemeClr val="bg1"/>
+                </a:solidFill>
+              </a:rPr>
               <a:t> </a:t>
             </a:r>
             <a:r>
-              <a:rPr lang="de-DE" sz="1800" dirty="0" err="1" smtClean="0"/>
+              <a:rPr lang="de-DE" sz="1800" dirty="0" err="1" smtClean="0">
+                <a:solidFill>
+                  <a:schemeClr val="bg1"/>
+                </a:solidFill>
+              </a:rPr>
               <a:t>Injection</a:t>
             </a:r>
-            <a:endParaRPr lang="de-DE" sz="1800" dirty="0" smtClean="0"/>
+            <a:endParaRPr lang="de-DE" sz="1800" dirty="0" smtClean="0">
+              <a:solidFill>
+                <a:schemeClr val="bg1"/>
+              </a:solidFill>
+            </a:endParaRPr>
           </a:p>
         </p:txBody>
       </p:sp>
@@ -4039,20 +4072,6 @@
 <file path=ppt/slides/slide3.xml><?xml version="1.0" encoding="utf-8"?>
 <p:sld xmlns:a="http://schemas.openxmlformats.org/drawingml/2006/main" xmlns:r="http://schemas.openxmlformats.org/officeDocument/2006/relationships" xmlns:p="http://schemas.openxmlformats.org/presentationml/2006/main">
   <p:cSld>
-    <p:bg>
-      <p:bgPr>
-        <a:blipFill dpi="0" rotWithShape="1">
-          <a:blip r:embed="rId2">
-            <a:lum/>
-          </a:blip>
-          <a:srcRect/>
-          <a:stretch>
-            <a:fillRect/>
-          </a:stretch>
-        </a:blipFill>
-        <a:effectLst/>
-      </p:bgPr>
-    </p:bg>
     <p:spTree>
       <p:nvGrpSpPr>
         <p:cNvPr id="1" name=""/>
@@ -4084,64 +4103,50 @@
           <a:p>
             <a:pPr algn="ctr"/>
             <a:r>
-              <a:rPr lang="de-DE" dirty="0" smtClean="0"/>
+              <a:rPr lang="de-DE" dirty="0" smtClean="0">
+                <a:solidFill>
+                  <a:schemeClr val="bg1"/>
+                </a:solidFill>
+              </a:rPr>
               <a:t>Scrum – Sprint 1</a:t>
             </a:r>
-            <a:endParaRPr lang="de-DE" dirty="0"/>
-          </a:p>
-        </p:txBody>
-      </p:sp>
-      <p:sp>
-        <p:nvSpPr>
-          <p:cNvPr id="3" name="Inhaltsplatzhalter 2"/>
-          <p:cNvSpPr>
-            <a:spLocks noGrp="1"/>
-          </p:cNvSpPr>
+            <a:endParaRPr lang="de-DE" dirty="0">
+              <a:solidFill>
+                <a:schemeClr val="bg1"/>
+              </a:solidFill>
+            </a:endParaRPr>
+          </a:p>
+        </p:txBody>
+      </p:sp>
+      <p:pic>
+        <p:nvPicPr>
+          <p:cNvPr id="4" name="Inhaltsplatzhalter 3"/>
+          <p:cNvPicPr>
+            <a:picLocks noGrp="1" noChangeAspect="1"/>
+          </p:cNvPicPr>
           <p:nvPr>
             <p:ph idx="1"/>
           </p:nvPr>
-        </p:nvSpPr>
-        <p:spPr/>
-        <p:txBody>
-          <a:bodyPr/>
-          <a:lstStyle/>
-          <a:p>
-            <a:r>
-              <a:rPr lang="de-DE" dirty="0" smtClean="0"/>
-              <a:t>&lt;</a:t>
-            </a:r>
-            <a:r>
-              <a:rPr lang="de-DE" dirty="0" err="1" smtClean="0"/>
-              <a:t>insert</a:t>
-            </a:r>
-            <a:r>
-              <a:rPr lang="de-DE" dirty="0" smtClean="0"/>
-              <a:t> Sprint 1 </a:t>
-            </a:r>
-            <a:r>
-              <a:rPr lang="de-DE" dirty="0" err="1" smtClean="0"/>
-              <a:t>Burndown</a:t>
-            </a:r>
-            <a:r>
-              <a:rPr lang="de-DE" dirty="0" smtClean="0"/>
-              <a:t> </a:t>
-            </a:r>
-            <a:r>
-              <a:rPr lang="de-DE" smtClean="0"/>
-              <a:t>Chart</a:t>
-            </a:r>
-            <a:r>
-              <a:rPr lang="de-DE" smtClean="0"/>
-              <a:t>&gt;</a:t>
-            </a:r>
-            <a:endParaRPr lang="de-DE" dirty="0" smtClean="0"/>
-          </a:p>
-          <a:p>
-            <a:pPr lvl="1"/>
-            <a:endParaRPr lang="de-DE" dirty="0"/>
-          </a:p>
-        </p:txBody>
-      </p:sp>
+        </p:nvPicPr>
+        <p:blipFill>
+          <a:blip r:embed="rId2">
+            <a:extLst>
+              <a:ext uri="{28A0092B-C50C-407E-A947-70E740481C1C}">
+                <a14:useLocalDpi xmlns:a14="http://schemas.microsoft.com/office/drawing/2010/main" val="0"/>
+              </a:ext>
+            </a:extLst>
+          </a:blip>
+          <a:stretch>
+            <a:fillRect/>
+          </a:stretch>
+        </p:blipFill>
+        <p:spPr>
+          <a:xfrm>
+            <a:off x="2828724" y="1893001"/>
+            <a:ext cx="6534552" cy="4351338"/>
+          </a:xfrm>
+        </p:spPr>
+      </p:pic>
     </p:spTree>
     <p:extLst>
       <p:ext uri="{BB962C8B-B14F-4D97-AF65-F5344CB8AC3E}">
@@ -4158,17 +4163,6 @@
 <file path=ppt/slides/slide4.xml><?xml version="1.0" encoding="utf-8"?>
 <p:sld xmlns:a="http://schemas.openxmlformats.org/drawingml/2006/main" xmlns:r="http://schemas.openxmlformats.org/officeDocument/2006/relationships" xmlns:p="http://schemas.openxmlformats.org/presentationml/2006/main">
   <p:cSld>
-    <p:bg>
-      <p:bgPr>
-        <a:blipFill>
-          <a:blip r:embed="rId2">
-            <a:alphaModFix amt="75000"/>
-          </a:blip>
-          <a:tile tx="0" ty="0" sx="100000" sy="100000" flip="none" algn="tl"/>
-        </a:blipFill>
-        <a:effectLst/>
-      </p:bgPr>
-    </p:bg>
     <p:spTree>
       <p:nvGrpSpPr>
         <p:cNvPr id="1" name=""/>
@@ -4200,10 +4194,18 @@
           <a:p>
             <a:pPr algn="ctr"/>
             <a:r>
-              <a:rPr lang="de-DE" dirty="0" smtClean="0"/>
+              <a:rPr lang="de-DE" dirty="0" smtClean="0">
+                <a:solidFill>
+                  <a:schemeClr val="bg1"/>
+                </a:solidFill>
+              </a:rPr>
               <a:t>Scrum – Sprint 2</a:t>
             </a:r>
-            <a:endParaRPr lang="de-DE" dirty="0"/>
+            <a:endParaRPr lang="de-DE" dirty="0">
+              <a:solidFill>
+                <a:schemeClr val="bg1"/>
+              </a:solidFill>
+            </a:endParaRPr>
           </a:p>
         </p:txBody>
       </p:sp>
@@ -4262,17 +4264,6 @@
 <file path=ppt/slides/slide5.xml><?xml version="1.0" encoding="utf-8"?>
 <p:sld xmlns:a="http://schemas.openxmlformats.org/drawingml/2006/main" xmlns:r="http://schemas.openxmlformats.org/officeDocument/2006/relationships" xmlns:p="http://schemas.openxmlformats.org/presentationml/2006/main">
   <p:cSld>
-    <p:bg>
-      <p:bgPr>
-        <a:blipFill>
-          <a:blip r:embed="rId2">
-            <a:alphaModFix amt="75000"/>
-          </a:blip>
-          <a:tile tx="0" ty="0" sx="100000" sy="100000" flip="none" algn="tl"/>
-        </a:blipFill>
-        <a:effectLst/>
-      </p:bgPr>
-    </p:bg>
     <p:spTree>
       <p:nvGrpSpPr>
         <p:cNvPr id="1" name=""/>
@@ -4304,72 +4295,58 @@
           <a:p>
             <a:pPr algn="ctr"/>
             <a:r>
-              <a:rPr lang="de-DE" dirty="0" smtClean="0"/>
+              <a:rPr lang="de-DE" dirty="0" smtClean="0">
+                <a:solidFill>
+                  <a:schemeClr val="bg1"/>
+                </a:solidFill>
+              </a:rPr>
               <a:t>Git - </a:t>
             </a:r>
             <a:r>
-              <a:rPr lang="de-DE" dirty="0" err="1" smtClean="0"/>
+              <a:rPr lang="de-DE" dirty="0" err="1" smtClean="0">
+                <a:solidFill>
+                  <a:schemeClr val="bg1"/>
+                </a:solidFill>
+              </a:rPr>
               <a:t>Contributers</a:t>
             </a:r>
-            <a:endParaRPr lang="de-DE" dirty="0"/>
-          </a:p>
-        </p:txBody>
-      </p:sp>
-      <p:sp>
-        <p:nvSpPr>
-          <p:cNvPr id="3" name="Inhaltsplatzhalter 2"/>
-          <p:cNvSpPr>
-            <a:spLocks noGrp="1"/>
-          </p:cNvSpPr>
+            <a:endParaRPr lang="de-DE" dirty="0">
+              <a:solidFill>
+                <a:schemeClr val="bg1"/>
+              </a:solidFill>
+            </a:endParaRPr>
+          </a:p>
+        </p:txBody>
+      </p:sp>
+      <p:pic>
+        <p:nvPicPr>
+          <p:cNvPr id="4" name="Inhaltsplatzhalter 3"/>
+          <p:cNvPicPr>
+            <a:picLocks noGrp="1" noChangeAspect="1"/>
+          </p:cNvPicPr>
           <p:nvPr>
             <p:ph idx="1"/>
           </p:nvPr>
-        </p:nvSpPr>
-        <p:spPr/>
-        <p:txBody>
-          <a:bodyPr/>
-          <a:lstStyle/>
-          <a:p>
-            <a:r>
-              <a:rPr lang="de-DE" dirty="0" smtClean="0"/>
-              <a:t>&lt;</a:t>
-            </a:r>
-            <a:r>
-              <a:rPr lang="de-DE" dirty="0" err="1" smtClean="0"/>
-              <a:t>insert</a:t>
-            </a:r>
-            <a:r>
-              <a:rPr lang="de-DE" dirty="0" smtClean="0"/>
-              <a:t> </a:t>
-            </a:r>
-            <a:r>
-              <a:rPr lang="de-DE" dirty="0" err="1" smtClean="0"/>
-              <a:t>picture</a:t>
-            </a:r>
-            <a:r>
-              <a:rPr lang="de-DE" dirty="0" smtClean="0"/>
-              <a:t> </a:t>
-            </a:r>
-            <a:r>
-              <a:rPr lang="de-DE" dirty="0" err="1" smtClean="0"/>
-              <a:t>of</a:t>
-            </a:r>
-            <a:r>
-              <a:rPr lang="de-DE" dirty="0" smtClean="0"/>
-              <a:t> </a:t>
-            </a:r>
-            <a:r>
-              <a:rPr lang="de-DE" dirty="0" err="1" smtClean="0"/>
-              <a:t>Contributer</a:t>
-            </a:r>
-            <a:r>
-              <a:rPr lang="de-DE" dirty="0" smtClean="0"/>
-              <a:t> Graph&gt;</a:t>
-            </a:r>
-            <a:endParaRPr lang="de-DE" dirty="0"/>
-          </a:p>
-        </p:txBody>
-      </p:sp>
+        </p:nvPicPr>
+        <p:blipFill>
+          <a:blip r:embed="rId2">
+            <a:extLst>
+              <a:ext uri="{28A0092B-C50C-407E-A947-70E740481C1C}">
+                <a14:useLocalDpi xmlns:a14="http://schemas.microsoft.com/office/drawing/2010/main" val="0"/>
+              </a:ext>
+            </a:extLst>
+          </a:blip>
+          <a:stretch>
+            <a:fillRect/>
+          </a:stretch>
+        </p:blipFill>
+        <p:spPr>
+          <a:xfrm>
+            <a:off x="2877378" y="1825625"/>
+            <a:ext cx="6437244" cy="4351338"/>
+          </a:xfrm>
+        </p:spPr>
+      </p:pic>
     </p:spTree>
     <p:extLst>
       <p:ext uri="{BB962C8B-B14F-4D97-AF65-F5344CB8AC3E}">
@@ -4417,64 +4394,82 @@
           <a:p>
             <a:pPr algn="ctr"/>
             <a:r>
-              <a:rPr lang="de-DE" dirty="0" smtClean="0"/>
-              <a:t>Git - </a:t>
-            </a:r>
-            <a:r>
-              <a:rPr lang="de-DE" dirty="0" err="1" smtClean="0"/>
+              <a:rPr lang="de-DE" dirty="0" err="1" smtClean="0">
+                <a:solidFill>
+                  <a:schemeClr val="bg1"/>
+                </a:solidFill>
+              </a:rPr>
+              <a:t>Git</a:t>
+            </a:r>
+            <a:r>
+              <a:rPr lang="de-DE" dirty="0" smtClean="0">
+                <a:solidFill>
+                  <a:schemeClr val="bg1"/>
+                </a:solidFill>
+              </a:rPr>
+              <a:t> </a:t>
+            </a:r>
+            <a:r>
+              <a:rPr lang="de-DE" dirty="0" smtClean="0">
+                <a:solidFill>
+                  <a:schemeClr val="bg1"/>
+                </a:solidFill>
+              </a:rPr>
+              <a:t>– </a:t>
+            </a:r>
+            <a:r>
+              <a:rPr lang="de-DE" dirty="0" err="1" smtClean="0">
+                <a:solidFill>
+                  <a:schemeClr val="bg1"/>
+                </a:solidFill>
+              </a:rPr>
               <a:t>Commits</a:t>
             </a:r>
-            <a:endParaRPr lang="de-DE" dirty="0"/>
-          </a:p>
-        </p:txBody>
-      </p:sp>
-      <p:sp>
-        <p:nvSpPr>
-          <p:cNvPr id="3" name="Inhaltsplatzhalter 2"/>
-          <p:cNvSpPr>
-            <a:spLocks noGrp="1"/>
-          </p:cNvSpPr>
+            <a:r>
+              <a:rPr lang="de-DE" dirty="0" smtClean="0">
+                <a:solidFill>
+                  <a:schemeClr val="bg1"/>
+                </a:solidFill>
+              </a:rPr>
+              <a:t> (Sprint 1)</a:t>
+            </a:r>
+            <a:endParaRPr lang="de-DE" dirty="0">
+              <a:solidFill>
+                <a:schemeClr val="bg1"/>
+              </a:solidFill>
+            </a:endParaRPr>
+          </a:p>
+        </p:txBody>
+      </p:sp>
+      <p:pic>
+        <p:nvPicPr>
+          <p:cNvPr id="4" name="Inhaltsplatzhalter 3"/>
+          <p:cNvPicPr>
+            <a:picLocks noGrp="1" noChangeAspect="1"/>
+          </p:cNvPicPr>
           <p:nvPr>
             <p:ph idx="1"/>
           </p:nvPr>
-        </p:nvSpPr>
-        <p:spPr/>
-        <p:txBody>
-          <a:bodyPr/>
-          <a:lstStyle/>
-          <a:p>
-            <a:r>
-              <a:rPr lang="de-DE" dirty="0" smtClean="0"/>
-              <a:t>&lt;</a:t>
-            </a:r>
-            <a:r>
-              <a:rPr lang="de-DE" dirty="0" err="1" smtClean="0"/>
-              <a:t>insert</a:t>
-            </a:r>
-            <a:r>
-              <a:rPr lang="de-DE" dirty="0" smtClean="0"/>
-              <a:t> </a:t>
-            </a:r>
-            <a:r>
-              <a:rPr lang="de-DE" dirty="0" err="1" smtClean="0"/>
-              <a:t>Commits</a:t>
-            </a:r>
-            <a:r>
-              <a:rPr lang="de-DE" dirty="0" smtClean="0"/>
-              <a:t> </a:t>
-            </a:r>
-            <a:r>
-              <a:rPr lang="de-DE" dirty="0" err="1" smtClean="0"/>
-              <a:t>picture</a:t>
-            </a:r>
-            <a:r>
-              <a:rPr lang="de-DE" dirty="0" smtClean="0"/>
-              <a:t>&gt;</a:t>
-            </a:r>
-            <a:endParaRPr lang="de-DE" dirty="0"/>
-          </a:p>
-        </p:txBody>
-      </p:sp>
+        </p:nvPicPr>
+        <p:blipFill>
+          <a:blip r:embed="rId2">
+            <a:extLst>
+              <a:ext uri="{28A0092B-C50C-407E-A947-70E740481C1C}">
+                <a14:useLocalDpi xmlns:a14="http://schemas.microsoft.com/office/drawing/2010/main" val="0"/>
+              </a:ext>
+            </a:extLst>
+          </a:blip>
+          <a:stretch>
+            <a:fillRect/>
+          </a:stretch>
+        </p:blipFill>
+        <p:spPr>
+          <a:xfrm>
+            <a:off x="3118564" y="1825625"/>
+            <a:ext cx="5954872" cy="4351338"/>
+          </a:xfrm>
+        </p:spPr>
+      </p:pic>
     </p:spTree>
     <p:extLst>
       <p:ext uri="{BB962C8B-B14F-4D97-AF65-F5344CB8AC3E}">
@@ -4522,22 +4517,42 @@
           <a:p>
             <a:pPr algn="ctr"/>
             <a:r>
-              <a:rPr lang="de-DE" dirty="0" err="1" smtClean="0"/>
+              <a:rPr lang="de-DE" dirty="0" err="1" smtClean="0">
+                <a:solidFill>
+                  <a:schemeClr val="bg1"/>
+                </a:solidFill>
+              </a:rPr>
               <a:t>Matching</a:t>
             </a:r>
             <a:r>
-              <a:rPr lang="de-DE" dirty="0" smtClean="0"/>
+              <a:rPr lang="de-DE" dirty="0" smtClean="0">
+                <a:solidFill>
+                  <a:schemeClr val="bg1"/>
+                </a:solidFill>
+              </a:rPr>
               <a:t> </a:t>
             </a:r>
             <a:r>
-              <a:rPr lang="de-DE" dirty="0" err="1" smtClean="0"/>
+              <a:rPr lang="de-DE" dirty="0" err="1" smtClean="0">
+                <a:solidFill>
+                  <a:schemeClr val="bg1"/>
+                </a:solidFill>
+              </a:rPr>
               <a:t>Textual</a:t>
             </a:r>
             <a:r>
-              <a:rPr lang="de-DE" dirty="0" smtClean="0"/>
+              <a:rPr lang="de-DE" dirty="0" smtClean="0">
+                <a:solidFill>
+                  <a:schemeClr val="bg1"/>
+                </a:solidFill>
+              </a:rPr>
               <a:t> Input</a:t>
             </a:r>
-            <a:endParaRPr lang="de-DE" dirty="0"/>
+            <a:endParaRPr lang="de-DE" dirty="0">
+              <a:solidFill>
+                <a:schemeClr val="bg1"/>
+              </a:solidFill>
+            </a:endParaRPr>
           </a:p>
         </p:txBody>
       </p:sp>
@@ -4588,14 +4603,6 @@
 <file path=ppt/slides/slide8.xml><?xml version="1.0" encoding="utf-8"?>
 <p:sld xmlns:a="http://schemas.openxmlformats.org/drawingml/2006/main" xmlns:r="http://schemas.openxmlformats.org/officeDocument/2006/relationships" xmlns:p="http://schemas.openxmlformats.org/presentationml/2006/main">
   <p:cSld>
-    <p:bg>
-      <p:bgPr>
-        <a:solidFill>
-          <a:schemeClr val="bg1"/>
-        </a:solidFill>
-        <a:effectLst/>
-      </p:bgPr>
-    </p:bg>
     <p:spTree>
       <p:nvGrpSpPr>
         <p:cNvPr id="1" name=""/>
@@ -4627,64 +4634,65 @@
           <a:p>
             <a:pPr algn="ctr"/>
             <a:r>
-              <a:rPr lang="de-DE" dirty="0" smtClean="0"/>
+              <a:rPr lang="de-DE" dirty="0" smtClean="0">
+                <a:solidFill>
+                  <a:schemeClr val="bg1"/>
+                </a:solidFill>
+              </a:rPr>
               <a:t>Model-View-Controller Architektur</a:t>
             </a:r>
-            <a:endParaRPr lang="de-DE" dirty="0"/>
-          </a:p>
-        </p:txBody>
-      </p:sp>
-      <p:sp>
-        <p:nvSpPr>
-          <p:cNvPr id="3" name="Inhaltsplatzhalter 2"/>
-          <p:cNvSpPr>
-            <a:spLocks noGrp="1"/>
-          </p:cNvSpPr>
-          <p:nvPr>
-            <p:ph idx="1"/>
-          </p:nvPr>
-        </p:nvSpPr>
-        <p:spPr/>
-        <p:txBody>
-          <a:bodyPr/>
-          <a:lstStyle/>
-          <a:p>
-            <a:r>
-              <a:rPr lang="de-DE" dirty="0" smtClean="0"/>
-              <a:t>&lt;</a:t>
-            </a:r>
-            <a:r>
-              <a:rPr lang="de-DE" dirty="0" err="1" smtClean="0"/>
-              <a:t>insert</a:t>
-            </a:r>
-            <a:r>
-              <a:rPr lang="de-DE" dirty="0" smtClean="0"/>
-              <a:t> </a:t>
-            </a:r>
-            <a:r>
-              <a:rPr lang="de-DE" dirty="0" err="1" smtClean="0"/>
-              <a:t>picture</a:t>
-            </a:r>
-            <a:r>
-              <a:rPr lang="de-DE" dirty="0" smtClean="0"/>
-              <a:t> </a:t>
-            </a:r>
-            <a:r>
-              <a:rPr lang="de-DE" dirty="0" err="1" smtClean="0"/>
-              <a:t>of</a:t>
-            </a:r>
-            <a:r>
-              <a:rPr lang="de-DE" dirty="0" smtClean="0"/>
-              <a:t> MVC-</a:t>
-            </a:r>
-            <a:r>
-              <a:rPr lang="de-DE" dirty="0" err="1" smtClean="0"/>
-              <a:t>architecture</a:t>
-            </a:r>
-            <a:r>
-              <a:rPr lang="de-DE" dirty="0" smtClean="0"/>
-              <a:t>&gt;</a:t>
-            </a:r>
+            <a:endParaRPr lang="de-DE" dirty="0">
+              <a:solidFill>
+                <a:schemeClr val="bg1"/>
+              </a:solidFill>
+            </a:endParaRPr>
+          </a:p>
+        </p:txBody>
+      </p:sp>
+      <p:pic>
+        <p:nvPicPr>
+          <p:cNvPr id="4" name="Inhaltsplatzhalter 3"/>
+          <p:cNvPicPr>
+            <a:picLocks noGrp="1" noChangeAspect="1"/>
+          </p:cNvPicPr>
+          <p:nvPr>
+            <p:ph sz="half" idx="1"/>
+          </p:nvPr>
+        </p:nvPicPr>
+        <p:blipFill>
+          <a:blip r:embed="rId2">
+            <a:extLst>
+              <a:ext uri="{28A0092B-C50C-407E-A947-70E740481C1C}">
+                <a14:useLocalDpi xmlns:a14="http://schemas.microsoft.com/office/drawing/2010/main" val="0"/>
+              </a:ext>
+            </a:extLst>
+          </a:blip>
+          <a:stretch>
+            <a:fillRect/>
+          </a:stretch>
+        </p:blipFill>
+        <p:spPr>
+          <a:xfrm>
+            <a:off x="1833340" y="2091265"/>
+            <a:ext cx="3191320" cy="3820058"/>
+          </a:xfrm>
+        </p:spPr>
+      </p:pic>
+      <p:sp>
+        <p:nvSpPr>
+          <p:cNvPr id="5" name="Inhaltsplatzhalter 4"/>
+          <p:cNvSpPr>
+            <a:spLocks noGrp="1"/>
+          </p:cNvSpPr>
+          <p:nvPr>
+            <p:ph sz="half" idx="2"/>
+          </p:nvPr>
+        </p:nvSpPr>
+        <p:spPr/>
+        <p:txBody>
+          <a:bodyPr/>
+          <a:lstStyle/>
+          <a:p>
             <a:endParaRPr lang="de-DE" dirty="0"/>
           </a:p>
         </p:txBody>
@@ -4736,18 +4744,34 @@
           <a:p>
             <a:pPr algn="ctr"/>
             <a:r>
-              <a:rPr lang="de-DE" dirty="0" smtClean="0"/>
+              <a:rPr lang="de-DE" dirty="0" smtClean="0">
+                <a:solidFill>
+                  <a:schemeClr val="bg1"/>
+                </a:solidFill>
+              </a:rPr>
               <a:t>Code </a:t>
             </a:r>
             <a:r>
-              <a:rPr lang="de-DE" dirty="0" err="1" smtClean="0"/>
+              <a:rPr lang="de-DE" dirty="0" err="1" smtClean="0">
+                <a:solidFill>
+                  <a:schemeClr val="bg1"/>
+                </a:solidFill>
+              </a:rPr>
               <a:t>Coverage</a:t>
             </a:r>
             <a:r>
-              <a:rPr lang="de-DE" dirty="0" smtClean="0"/>
+              <a:rPr lang="de-DE" dirty="0" smtClean="0">
+                <a:solidFill>
+                  <a:schemeClr val="bg1"/>
+                </a:solidFill>
+              </a:rPr>
               <a:t> / Tests</a:t>
             </a:r>
-            <a:endParaRPr lang="de-DE" dirty="0"/>
+            <a:endParaRPr lang="de-DE" dirty="0">
+              <a:solidFill>
+                <a:schemeClr val="bg1"/>
+              </a:solidFill>
+            </a:endParaRPr>
           </a:p>
         </p:txBody>
       </p:sp>

</xml_diff>